<commit_message>
added note from nov. 7th
</commit_message>
<xml_diff>
--- a/doc/A_question_4_instructor.pptx
+++ b/doc/A_question_4_instructor.pptx
@@ -5,8 +5,13 @@
     <p:sldMasterId id="2147483648" r:id="rId1"/>
   </p:sldMasterIdLst>
   <p:sldIdLst>
-    <p:sldId id="269" r:id="rId2"/>
+    <p:sldId id="290" r:id="rId2"/>
     <p:sldId id="272" r:id="rId3"/>
+    <p:sldId id="292" r:id="rId4"/>
+    <p:sldId id="291" r:id="rId5"/>
+    <p:sldId id="289" r:id="rId6"/>
+    <p:sldId id="293" r:id="rId7"/>
+    <p:sldId id="294" r:id="rId8"/>
   </p:sldIdLst>
   <p:sldSz cx="12192000" cy="6858000"/>
   <p:notesSz cx="6858000" cy="9144000"/>
@@ -105,6 +110,11 @@
       </a:defRPr>
     </a:lvl9pPr>
   </p:defaultTextStyle>
+  <p:extLst>
+    <p:ext uri="{EFAFB233-063F-42B5-8137-9DF3F51BA10A}">
+      <p15:sldGuideLst xmlns:p15="http://schemas.microsoft.com/office/powerpoint/2012/main"/>
+    </p:ext>
+  </p:extLst>
 </p:presentation>
 </file>
 
@@ -255,7 +265,7 @@
           <a:p>
             <a:fld id="{BA58BA05-EAFF-E049-B5FB-F76367788ED5}" type="datetimeFigureOut">
               <a:rPr lang="en-US" smtClean="0"/>
-              <a:t>11/5/20</a:t>
+              <a:t>11/7/20</a:t>
             </a:fld>
             <a:endParaRPr lang="en-US"/>
           </a:p>
@@ -453,7 +463,7 @@
           <a:p>
             <a:fld id="{BA58BA05-EAFF-E049-B5FB-F76367788ED5}" type="datetimeFigureOut">
               <a:rPr lang="en-US" smtClean="0"/>
-              <a:t>11/5/20</a:t>
+              <a:t>11/7/20</a:t>
             </a:fld>
             <a:endParaRPr lang="en-US"/>
           </a:p>
@@ -661,7 +671,7 @@
           <a:p>
             <a:fld id="{BA58BA05-EAFF-E049-B5FB-F76367788ED5}" type="datetimeFigureOut">
               <a:rPr lang="en-US" smtClean="0"/>
-              <a:t>11/5/20</a:t>
+              <a:t>11/7/20</a:t>
             </a:fld>
             <a:endParaRPr lang="en-US"/>
           </a:p>
@@ -859,7 +869,7 @@
           <a:p>
             <a:fld id="{BA58BA05-EAFF-E049-B5FB-F76367788ED5}" type="datetimeFigureOut">
               <a:rPr lang="en-US" smtClean="0"/>
-              <a:t>11/5/20</a:t>
+              <a:t>11/7/20</a:t>
             </a:fld>
             <a:endParaRPr lang="en-US"/>
           </a:p>
@@ -1134,7 +1144,7 @@
           <a:p>
             <a:fld id="{BA58BA05-EAFF-E049-B5FB-F76367788ED5}" type="datetimeFigureOut">
               <a:rPr lang="en-US" smtClean="0"/>
-              <a:t>11/5/20</a:t>
+              <a:t>11/7/20</a:t>
             </a:fld>
             <a:endParaRPr lang="en-US"/>
           </a:p>
@@ -1399,7 +1409,7 @@
           <a:p>
             <a:fld id="{BA58BA05-EAFF-E049-B5FB-F76367788ED5}" type="datetimeFigureOut">
               <a:rPr lang="en-US" smtClean="0"/>
-              <a:t>11/5/20</a:t>
+              <a:t>11/7/20</a:t>
             </a:fld>
             <a:endParaRPr lang="en-US"/>
           </a:p>
@@ -1811,7 +1821,7 @@
           <a:p>
             <a:fld id="{BA58BA05-EAFF-E049-B5FB-F76367788ED5}" type="datetimeFigureOut">
               <a:rPr lang="en-US" smtClean="0"/>
-              <a:t>11/5/20</a:t>
+              <a:t>11/7/20</a:t>
             </a:fld>
             <a:endParaRPr lang="en-US"/>
           </a:p>
@@ -1952,7 +1962,7 @@
           <a:p>
             <a:fld id="{BA58BA05-EAFF-E049-B5FB-F76367788ED5}" type="datetimeFigureOut">
               <a:rPr lang="en-US" smtClean="0"/>
-              <a:t>11/5/20</a:t>
+              <a:t>11/7/20</a:t>
             </a:fld>
             <a:endParaRPr lang="en-US"/>
           </a:p>
@@ -2065,7 +2075,7 @@
           <a:p>
             <a:fld id="{BA58BA05-EAFF-E049-B5FB-F76367788ED5}" type="datetimeFigureOut">
               <a:rPr lang="en-US" smtClean="0"/>
-              <a:t>11/5/20</a:t>
+              <a:t>11/7/20</a:t>
             </a:fld>
             <a:endParaRPr lang="en-US"/>
           </a:p>
@@ -2376,7 +2386,7 @@
           <a:p>
             <a:fld id="{BA58BA05-EAFF-E049-B5FB-F76367788ED5}" type="datetimeFigureOut">
               <a:rPr lang="en-US" smtClean="0"/>
-              <a:t>11/5/20</a:t>
+              <a:t>11/7/20</a:t>
             </a:fld>
             <a:endParaRPr lang="en-US"/>
           </a:p>
@@ -2664,7 +2674,7 @@
           <a:p>
             <a:fld id="{BA58BA05-EAFF-E049-B5FB-F76367788ED5}" type="datetimeFigureOut">
               <a:rPr lang="en-US" smtClean="0"/>
-              <a:t>11/5/20</a:t>
+              <a:t>11/7/20</a:t>
             </a:fld>
             <a:endParaRPr lang="en-US"/>
           </a:p>
@@ -2905,7 +2915,7 @@
           <a:p>
             <a:fld id="{BA58BA05-EAFF-E049-B5FB-F76367788ED5}" type="datetimeFigureOut">
               <a:rPr lang="en-US" smtClean="0"/>
-              <a:t>11/5/20</a:t>
+              <a:t>11/7/20</a:t>
             </a:fld>
             <a:endParaRPr lang="en-US"/>
           </a:p>
@@ -3338,14 +3348,21 @@
             <p:ph type="title"/>
           </p:nvPr>
         </p:nvSpPr>
-        <p:spPr/>
-        <p:txBody>
-          <a:bodyPr/>
-          <a:lstStyle/>
-          <a:p>
-            <a:r>
-              <a:rPr lang="en-US" dirty="0"/>
-              <a:t>The only possible explanation</a:t>
+        <p:spPr>
+          <a:xfrm>
+            <a:off x="630972" y="242556"/>
+            <a:ext cx="10930054" cy="1325563"/>
+          </a:xfrm>
+        </p:spPr>
+        <p:txBody>
+          <a:bodyPr>
+            <a:normAutofit/>
+          </a:bodyPr>
+          <a:lstStyle/>
+          <a:p>
+            <a:r>
+              <a:rPr lang="en-US" sz="4000" dirty="0"/>
+              <a:t>Q1: 27% of female survivals – where does it come from?</a:t>
             </a:r>
           </a:p>
         </p:txBody>
@@ -3374,7 +3391,7 @@
         </p:spPr>
         <p:txBody>
           <a:bodyPr>
-            <a:normAutofit lnSpcReduction="10000"/>
+            <a:normAutofit/>
           </a:bodyPr>
           <a:lstStyle/>
           <a:p>
@@ -3392,19 +3409,7 @@
           <a:p>
             <a:r>
               <a:rPr lang="en-US" dirty="0"/>
-              <a:t>Then, out of 239 females, 180 survived</a:t>
-            </a:r>
-          </a:p>
-          <a:p>
-            <a:r>
-              <a:rPr lang="en-US" dirty="0"/>
-              <a:t>Therefore, it reports as 180/663 = 27.15%</a:t>
-            </a:r>
-          </a:p>
-          <a:p>
-            <a:r>
-              <a:rPr lang="en-US" dirty="0"/>
-              <a:t>I think it is </a:t>
+              <a:t>Then, out of 239 females, 180 survived, </a:t>
             </a:r>
             <a:r>
               <a:rPr lang="en-US" b="1" dirty="0">
@@ -3412,7 +3417,13 @@
                   <a:srgbClr val="FF0000"/>
                 </a:solidFill>
               </a:rPr>
-              <a:t>WRONG!</a:t>
+              <a:t>180/239 = 75.31%</a:t>
+            </a:r>
+          </a:p>
+          <a:p>
+            <a:r>
+              <a:rPr lang="en-US" dirty="0"/>
+              <a:t>Therefore, it reports as 180/663 = 27.15%</a:t>
             </a:r>
           </a:p>
         </p:txBody>
@@ -3450,7 +3461,7 @@
     </p:spTree>
     <p:extLst>
       <p:ext uri="{BB962C8B-B14F-4D97-AF65-F5344CB8AC3E}">
-        <p14:creationId xmlns:p14="http://schemas.microsoft.com/office/powerpoint/2010/main" val="3979260946"/>
+        <p14:creationId xmlns:p14="http://schemas.microsoft.com/office/powerpoint/2010/main" val="3012979649"/>
       </p:ext>
     </p:extLst>
   </p:cSld>
@@ -3502,7 +3513,19 @@
           <a:p>
             <a:r>
               <a:rPr lang="en-US" sz="4000" dirty="0"/>
-              <a:t>In the code, I found this and I think it is </a:t>
+              <a:t>In the code, I found this </a:t>
+            </a:r>
+            <a:r>
+              <a:rPr lang="en-US" sz="4000" b="1" dirty="0">
+                <a:solidFill>
+                  <a:srgbClr val="FF0000"/>
+                </a:solidFill>
+              </a:rPr>
+              <a:t>BUT</a:t>
+            </a:r>
+            <a:r>
+              <a:rPr lang="en-US" sz="4000" dirty="0"/>
+              <a:t> I think it is </a:t>
             </a:r>
             <a:r>
               <a:rPr lang="en-US" sz="4000" b="1" dirty="0">
@@ -3550,6 +3573,888 @@
     <p:extLst>
       <p:ext uri="{BB962C8B-B14F-4D97-AF65-F5344CB8AC3E}">
         <p14:creationId xmlns:p14="http://schemas.microsoft.com/office/powerpoint/2010/main" val="1675876538"/>
+      </p:ext>
+    </p:extLst>
+  </p:cSld>
+  <p:clrMapOvr>
+    <a:masterClrMapping/>
+  </p:clrMapOvr>
+</p:sld>
+</file>
+
+<file path=ppt/slides/slide3.xml><?xml version="1.0" encoding="utf-8"?>
+<p:sld xmlns:a="http://schemas.openxmlformats.org/drawingml/2006/main" xmlns:r="http://schemas.openxmlformats.org/officeDocument/2006/relationships" xmlns:p="http://schemas.openxmlformats.org/presentationml/2006/main">
+  <p:cSld>
+    <p:spTree>
+      <p:nvGrpSpPr>
+        <p:cNvPr id="1" name=""/>
+        <p:cNvGrpSpPr/>
+        <p:nvPr/>
+      </p:nvGrpSpPr>
+      <p:grpSpPr>
+        <a:xfrm>
+          <a:off x="0" y="0"/>
+          <a:ext cx="0" cy="0"/>
+          <a:chOff x="0" y="0"/>
+          <a:chExt cx="0" cy="0"/>
+        </a:xfrm>
+      </p:grpSpPr>
+      <p:sp>
+        <p:nvSpPr>
+          <p:cNvPr id="2" name="Title 1">
+            <a:extLst>
+              <a:ext uri="{FF2B5EF4-FFF2-40B4-BE49-F238E27FC236}">
+                <a16:creationId xmlns:a16="http://schemas.microsoft.com/office/drawing/2014/main" id="{454A18B4-44F9-FD44-939F-33474071D164}"/>
+              </a:ext>
+            </a:extLst>
+          </p:cNvPr>
+          <p:cNvSpPr>
+            <a:spLocks noGrp="1"/>
+          </p:cNvSpPr>
+          <p:nvPr>
+            <p:ph type="title"/>
+          </p:nvPr>
+        </p:nvSpPr>
+        <p:spPr>
+          <a:xfrm>
+            <a:off x="838200" y="365125"/>
+            <a:ext cx="10871200" cy="1325563"/>
+          </a:xfrm>
+        </p:spPr>
+        <p:txBody>
+          <a:bodyPr/>
+          <a:lstStyle/>
+          <a:p>
+            <a:r>
+              <a:rPr lang="en-US" dirty="0"/>
+              <a:t>The professor’s response  -- I can barely accept</a:t>
+            </a:r>
+          </a:p>
+        </p:txBody>
+      </p:sp>
+      <p:pic>
+        <p:nvPicPr>
+          <p:cNvPr id="4" name="Picture 3">
+            <a:extLst>
+              <a:ext uri="{FF2B5EF4-FFF2-40B4-BE49-F238E27FC236}">
+                <a16:creationId xmlns:a16="http://schemas.microsoft.com/office/drawing/2014/main" id="{CA3E8E44-CF20-7F4E-98AF-6CCB3B02E1EC}"/>
+              </a:ext>
+            </a:extLst>
+          </p:cNvPr>
+          <p:cNvPicPr>
+            <a:picLocks noChangeAspect="1"/>
+          </p:cNvPicPr>
+          <p:nvPr/>
+        </p:nvPicPr>
+        <p:blipFill>
+          <a:blip r:embed="rId2"/>
+          <a:stretch>
+            <a:fillRect/>
+          </a:stretch>
+        </p:blipFill>
+        <p:spPr>
+          <a:xfrm>
+            <a:off x="2717800" y="1902562"/>
+            <a:ext cx="6756400" cy="1574800"/>
+          </a:xfrm>
+          <a:prstGeom prst="rect">
+            <a:avLst/>
+          </a:prstGeom>
+        </p:spPr>
+      </p:pic>
+      <p:sp>
+        <p:nvSpPr>
+          <p:cNvPr id="6" name="TextBox 5">
+            <a:extLst>
+              <a:ext uri="{FF2B5EF4-FFF2-40B4-BE49-F238E27FC236}">
+                <a16:creationId xmlns:a16="http://schemas.microsoft.com/office/drawing/2014/main" id="{026E7C64-76C7-2446-AE61-06AAD6377AB4}"/>
+              </a:ext>
+            </a:extLst>
+          </p:cNvPr>
+          <p:cNvSpPr txBox="1"/>
+          <p:nvPr/>
+        </p:nvSpPr>
+        <p:spPr>
+          <a:xfrm>
+            <a:off x="3802566" y="5921298"/>
+            <a:ext cx="4075539" cy="369332"/>
+          </a:xfrm>
+          <a:prstGeom prst="rect">
+            <a:avLst/>
+          </a:prstGeom>
+          <a:noFill/>
+        </p:spPr>
+        <p:txBody>
+          <a:bodyPr wrap="none" rtlCol="0">
+            <a:spAutoFit/>
+          </a:bodyPr>
+          <a:lstStyle/>
+          <a:p>
+            <a:r>
+              <a:rPr lang="en-US" dirty="0"/>
+              <a:t>Female survival rate is: 233/314 = </a:t>
+            </a:r>
+            <a:r>
+              <a:rPr lang="en-US" b="1" dirty="0">
+                <a:solidFill>
+                  <a:srgbClr val="FF0000"/>
+                </a:solidFill>
+              </a:rPr>
+              <a:t>74.20%</a:t>
+            </a:r>
+          </a:p>
+        </p:txBody>
+      </p:sp>
+      <p:sp>
+        <p:nvSpPr>
+          <p:cNvPr id="7" name="TextBox 6">
+            <a:extLst>
+              <a:ext uri="{FF2B5EF4-FFF2-40B4-BE49-F238E27FC236}">
+                <a16:creationId xmlns:a16="http://schemas.microsoft.com/office/drawing/2014/main" id="{8C9B7C7B-4D26-2B49-A3AD-A68DD54C8DA0}"/>
+              </a:ext>
+            </a:extLst>
+          </p:cNvPr>
+          <p:cNvSpPr txBox="1"/>
+          <p:nvPr/>
+        </p:nvSpPr>
+        <p:spPr>
+          <a:xfrm>
+            <a:off x="7538381" y="6389648"/>
+            <a:ext cx="3871637" cy="369332"/>
+          </a:xfrm>
+          <a:prstGeom prst="rect">
+            <a:avLst/>
+          </a:prstGeom>
+          <a:noFill/>
+        </p:spPr>
+        <p:txBody>
+          <a:bodyPr wrap="none" rtlCol="0">
+            <a:spAutoFit/>
+          </a:bodyPr>
+          <a:lstStyle/>
+          <a:p>
+            <a:r>
+              <a:rPr lang="en-US" dirty="0"/>
+              <a:t>https://</a:t>
+            </a:r>
+            <a:r>
+              <a:rPr lang="en-US" dirty="0" err="1"/>
+              <a:t>www.kaggle.com</a:t>
+            </a:r>
+            <a:r>
+              <a:rPr lang="en-US" dirty="0"/>
+              <a:t>/c/titanic/data</a:t>
+            </a:r>
+          </a:p>
+        </p:txBody>
+      </p:sp>
+      <p:pic>
+        <p:nvPicPr>
+          <p:cNvPr id="9" name="Picture 8">
+            <a:extLst>
+              <a:ext uri="{FF2B5EF4-FFF2-40B4-BE49-F238E27FC236}">
+                <a16:creationId xmlns:a16="http://schemas.microsoft.com/office/drawing/2014/main" id="{7CD35C55-D007-DE40-A77A-D2CBAFBF1631}"/>
+              </a:ext>
+            </a:extLst>
+          </p:cNvPr>
+          <p:cNvPicPr>
+            <a:picLocks noChangeAspect="1"/>
+          </p:cNvPicPr>
+          <p:nvPr/>
+        </p:nvPicPr>
+        <p:blipFill>
+          <a:blip r:embed="rId3"/>
+          <a:stretch>
+            <a:fillRect/>
+          </a:stretch>
+        </p:blipFill>
+        <p:spPr>
+          <a:xfrm>
+            <a:off x="3098800" y="3670630"/>
+            <a:ext cx="5994400" cy="2057400"/>
+          </a:xfrm>
+          <a:prstGeom prst="rect">
+            <a:avLst/>
+          </a:prstGeom>
+        </p:spPr>
+      </p:pic>
+    </p:spTree>
+    <p:extLst>
+      <p:ext uri="{BB962C8B-B14F-4D97-AF65-F5344CB8AC3E}">
+        <p14:creationId xmlns:p14="http://schemas.microsoft.com/office/powerpoint/2010/main" val="4149749035"/>
+      </p:ext>
+    </p:extLst>
+  </p:cSld>
+  <p:clrMapOvr>
+    <a:masterClrMapping/>
+  </p:clrMapOvr>
+</p:sld>
+</file>
+
+<file path=ppt/slides/slide4.xml><?xml version="1.0" encoding="utf-8"?>
+<p:sld xmlns:a="http://schemas.openxmlformats.org/drawingml/2006/main" xmlns:r="http://schemas.openxmlformats.org/officeDocument/2006/relationships" xmlns:p="http://schemas.openxmlformats.org/presentationml/2006/main">
+  <p:cSld>
+    <p:spTree>
+      <p:nvGrpSpPr>
+        <p:cNvPr id="1" name=""/>
+        <p:cNvGrpSpPr/>
+        <p:nvPr/>
+      </p:nvGrpSpPr>
+      <p:grpSpPr>
+        <a:xfrm>
+          <a:off x="0" y="0"/>
+          <a:ext cx="0" cy="0"/>
+          <a:chOff x="0" y="0"/>
+          <a:chExt cx="0" cy="0"/>
+        </a:xfrm>
+      </p:grpSpPr>
+      <p:sp>
+        <p:nvSpPr>
+          <p:cNvPr id="2" name="Title 1">
+            <a:extLst>
+              <a:ext uri="{FF2B5EF4-FFF2-40B4-BE49-F238E27FC236}">
+                <a16:creationId xmlns:a16="http://schemas.microsoft.com/office/drawing/2014/main" id="{123A5C15-4223-5249-A5B3-518597E00C3B}"/>
+              </a:ext>
+            </a:extLst>
+          </p:cNvPr>
+          <p:cNvSpPr>
+            <a:spLocks noGrp="1"/>
+          </p:cNvSpPr>
+          <p:nvPr>
+            <p:ph type="title"/>
+          </p:nvPr>
+        </p:nvSpPr>
+        <p:spPr/>
+        <p:txBody>
+          <a:bodyPr/>
+          <a:lstStyle/>
+          <a:p>
+            <a:r>
+              <a:rPr lang="en-US" dirty="0"/>
+              <a:t>Q2:we will NEVER have this case?</a:t>
+            </a:r>
+          </a:p>
+        </p:txBody>
+      </p:sp>
+      <p:pic>
+        <p:nvPicPr>
+          <p:cNvPr id="4" name="Picture 3">
+            <a:extLst>
+              <a:ext uri="{FF2B5EF4-FFF2-40B4-BE49-F238E27FC236}">
+                <a16:creationId xmlns:a16="http://schemas.microsoft.com/office/drawing/2014/main" id="{D98E16D1-8381-4A4E-90DA-BDA06E131030}"/>
+              </a:ext>
+            </a:extLst>
+          </p:cNvPr>
+          <p:cNvPicPr>
+            <a:picLocks noChangeAspect="1"/>
+          </p:cNvPicPr>
+          <p:nvPr/>
+        </p:nvPicPr>
+        <p:blipFill>
+          <a:blip r:embed="rId2"/>
+          <a:stretch>
+            <a:fillRect/>
+          </a:stretch>
+        </p:blipFill>
+        <p:spPr>
+          <a:xfrm>
+            <a:off x="120650" y="2317750"/>
+            <a:ext cx="11950700" cy="1384300"/>
+          </a:xfrm>
+          <a:prstGeom prst="rect">
+            <a:avLst/>
+          </a:prstGeom>
+        </p:spPr>
+      </p:pic>
+      <p:pic>
+        <p:nvPicPr>
+          <p:cNvPr id="6" name="Picture 5">
+            <a:extLst>
+              <a:ext uri="{FF2B5EF4-FFF2-40B4-BE49-F238E27FC236}">
+                <a16:creationId xmlns:a16="http://schemas.microsoft.com/office/drawing/2014/main" id="{AAF8CAE8-1B33-9449-9CBC-7941662E1D5E}"/>
+              </a:ext>
+            </a:extLst>
+          </p:cNvPr>
+          <p:cNvPicPr>
+            <a:picLocks noChangeAspect="1"/>
+          </p:cNvPicPr>
+          <p:nvPr/>
+        </p:nvPicPr>
+        <p:blipFill>
+          <a:blip r:embed="rId3"/>
+          <a:stretch>
+            <a:fillRect/>
+          </a:stretch>
+        </p:blipFill>
+        <p:spPr>
+          <a:xfrm>
+            <a:off x="0" y="5181600"/>
+            <a:ext cx="12192000" cy="956004"/>
+          </a:xfrm>
+          <a:prstGeom prst="rect">
+            <a:avLst/>
+          </a:prstGeom>
+        </p:spPr>
+      </p:pic>
+      <p:sp>
+        <p:nvSpPr>
+          <p:cNvPr id="7" name="TextBox 6">
+            <a:extLst>
+              <a:ext uri="{FF2B5EF4-FFF2-40B4-BE49-F238E27FC236}">
+                <a16:creationId xmlns:a16="http://schemas.microsoft.com/office/drawing/2014/main" id="{7E08F0CE-4194-4B44-96E9-1EBF36A4BFD5}"/>
+              </a:ext>
+            </a:extLst>
+          </p:cNvPr>
+          <p:cNvSpPr txBox="1"/>
+          <p:nvPr/>
+        </p:nvSpPr>
+        <p:spPr>
+          <a:xfrm>
+            <a:off x="1727200" y="4144446"/>
+            <a:ext cx="9176615" cy="461665"/>
+          </a:xfrm>
+          <a:prstGeom prst="rect">
+            <a:avLst/>
+          </a:prstGeom>
+          <a:solidFill>
+            <a:srgbClr val="FFFF00"/>
+          </a:solidFill>
+        </p:spPr>
+        <p:txBody>
+          <a:bodyPr wrap="none" rtlCol="0">
+            <a:spAutoFit/>
+          </a:bodyPr>
+          <a:lstStyle/>
+          <a:p>
+            <a:r>
+              <a:rPr lang="en-US" sz="2400" dirty="0"/>
+              <a:t>Given the tree in the homework instruction, how can we get answer 1??</a:t>
+            </a:r>
+          </a:p>
+        </p:txBody>
+      </p:sp>
+      <p:sp>
+        <p:nvSpPr>
+          <p:cNvPr id="8" name="Down Arrow 7">
+            <a:extLst>
+              <a:ext uri="{FF2B5EF4-FFF2-40B4-BE49-F238E27FC236}">
+                <a16:creationId xmlns:a16="http://schemas.microsoft.com/office/drawing/2014/main" id="{A5B548CD-6CFE-C243-9D1E-D9EFBB699629}"/>
+              </a:ext>
+            </a:extLst>
+          </p:cNvPr>
+          <p:cNvSpPr/>
+          <p:nvPr/>
+        </p:nvSpPr>
+        <p:spPr>
+          <a:xfrm>
+            <a:off x="5753100" y="4694102"/>
+            <a:ext cx="546100" cy="652597"/>
+          </a:xfrm>
+          <a:prstGeom prst="downArrow">
+            <a:avLst/>
+          </a:prstGeom>
+        </p:spPr>
+        <p:style>
+          <a:lnRef idx="2">
+            <a:schemeClr val="accent1">
+              <a:shade val="50000"/>
+            </a:schemeClr>
+          </a:lnRef>
+          <a:fillRef idx="1">
+            <a:schemeClr val="accent1"/>
+          </a:fillRef>
+          <a:effectRef idx="0">
+            <a:schemeClr val="accent1"/>
+          </a:effectRef>
+          <a:fontRef idx="minor">
+            <a:schemeClr val="lt1"/>
+          </a:fontRef>
+        </p:style>
+        <p:txBody>
+          <a:bodyPr rtlCol="0" anchor="ctr"/>
+          <a:lstStyle/>
+          <a:p>
+            <a:pPr algn="ctr"/>
+            <a:endParaRPr lang="en-US"/>
+          </a:p>
+        </p:txBody>
+      </p:sp>
+    </p:spTree>
+    <p:extLst>
+      <p:ext uri="{BB962C8B-B14F-4D97-AF65-F5344CB8AC3E}">
+        <p14:creationId xmlns:p14="http://schemas.microsoft.com/office/powerpoint/2010/main" val="607723454"/>
+      </p:ext>
+    </p:extLst>
+  </p:cSld>
+  <p:clrMapOvr>
+    <a:masterClrMapping/>
+  </p:clrMapOvr>
+</p:sld>
+</file>
+
+<file path=ppt/slides/slide5.xml><?xml version="1.0" encoding="utf-8"?>
+<p:sld xmlns:a="http://schemas.openxmlformats.org/drawingml/2006/main" xmlns:r="http://schemas.openxmlformats.org/officeDocument/2006/relationships" xmlns:p="http://schemas.openxmlformats.org/presentationml/2006/main">
+  <p:cSld>
+    <p:spTree>
+      <p:nvGrpSpPr>
+        <p:cNvPr id="1" name=""/>
+        <p:cNvGrpSpPr/>
+        <p:nvPr/>
+      </p:nvGrpSpPr>
+      <p:grpSpPr>
+        <a:xfrm>
+          <a:off x="0" y="0"/>
+          <a:ext cx="0" cy="0"/>
+          <a:chOff x="0" y="0"/>
+          <a:chExt cx="0" cy="0"/>
+        </a:xfrm>
+      </p:grpSpPr>
+      <p:sp>
+        <p:nvSpPr>
+          <p:cNvPr id="2" name="Title 1">
+            <a:extLst>
+              <a:ext uri="{FF2B5EF4-FFF2-40B4-BE49-F238E27FC236}">
+                <a16:creationId xmlns:a16="http://schemas.microsoft.com/office/drawing/2014/main" id="{04728E9E-8AE3-294E-B5C4-3B0D9F991375}"/>
+              </a:ext>
+            </a:extLst>
+          </p:cNvPr>
+          <p:cNvSpPr>
+            <a:spLocks noGrp="1"/>
+          </p:cNvSpPr>
+          <p:nvPr>
+            <p:ph type="title"/>
+          </p:nvPr>
+        </p:nvSpPr>
+        <p:spPr/>
+        <p:txBody>
+          <a:bodyPr/>
+          <a:lstStyle/>
+          <a:p>
+            <a:r>
+              <a:rPr lang="en-US" dirty="0"/>
+              <a:t>Q3, which/where is the simulated data? </a:t>
+            </a:r>
+          </a:p>
+        </p:txBody>
+      </p:sp>
+      <p:pic>
+        <p:nvPicPr>
+          <p:cNvPr id="4" name="Picture 3">
+            <a:extLst>
+              <a:ext uri="{FF2B5EF4-FFF2-40B4-BE49-F238E27FC236}">
+                <a16:creationId xmlns:a16="http://schemas.microsoft.com/office/drawing/2014/main" id="{5C33ABA5-2006-5D48-8486-144FB3A7ABCE}"/>
+              </a:ext>
+            </a:extLst>
+          </p:cNvPr>
+          <p:cNvPicPr>
+            <a:picLocks noChangeAspect="1"/>
+          </p:cNvPicPr>
+          <p:nvPr/>
+        </p:nvPicPr>
+        <p:blipFill>
+          <a:blip r:embed="rId2"/>
+          <a:stretch>
+            <a:fillRect/>
+          </a:stretch>
+        </p:blipFill>
+        <p:spPr>
+          <a:xfrm>
+            <a:off x="241300" y="2667000"/>
+            <a:ext cx="11709400" cy="1524000"/>
+          </a:xfrm>
+          <a:prstGeom prst="rect">
+            <a:avLst/>
+          </a:prstGeom>
+        </p:spPr>
+      </p:pic>
+      <p:sp>
+        <p:nvSpPr>
+          <p:cNvPr id="5" name="TextBox 4">
+            <a:extLst>
+              <a:ext uri="{FF2B5EF4-FFF2-40B4-BE49-F238E27FC236}">
+                <a16:creationId xmlns:a16="http://schemas.microsoft.com/office/drawing/2014/main" id="{5DA38050-5F40-5C46-A7F2-DA639EC74D30}"/>
+              </a:ext>
+            </a:extLst>
+          </p:cNvPr>
+          <p:cNvSpPr txBox="1"/>
+          <p:nvPr/>
+        </p:nvSpPr>
+        <p:spPr>
+          <a:xfrm>
+            <a:off x="4076700" y="5167312"/>
+            <a:ext cx="2426498" cy="523220"/>
+          </a:xfrm>
+          <a:prstGeom prst="rect">
+            <a:avLst/>
+          </a:prstGeom>
+          <a:solidFill>
+            <a:srgbClr val="FFFF00"/>
+          </a:solidFill>
+        </p:spPr>
+        <p:txBody>
+          <a:bodyPr wrap="none" rtlCol="0">
+            <a:spAutoFit/>
+          </a:bodyPr>
+          <a:lstStyle/>
+          <a:p>
+            <a:r>
+              <a:rPr lang="en-US" sz="2800" b="1" dirty="0"/>
+              <a:t>Is it </a:t>
+            </a:r>
+            <a:r>
+              <a:rPr lang="en-US" sz="2800" b="1" dirty="0" err="1"/>
+              <a:t>input.txt</a:t>
+            </a:r>
+            <a:r>
+              <a:rPr lang="en-US" sz="2800" b="1" dirty="0"/>
+              <a:t>??</a:t>
+            </a:r>
+          </a:p>
+        </p:txBody>
+      </p:sp>
+    </p:spTree>
+    <p:extLst>
+      <p:ext uri="{BB962C8B-B14F-4D97-AF65-F5344CB8AC3E}">
+        <p14:creationId xmlns:p14="http://schemas.microsoft.com/office/powerpoint/2010/main" val="3420579257"/>
+      </p:ext>
+    </p:extLst>
+  </p:cSld>
+  <p:clrMapOvr>
+    <a:masterClrMapping/>
+  </p:clrMapOvr>
+</p:sld>
+</file>
+
+<file path=ppt/slides/slide6.xml><?xml version="1.0" encoding="utf-8"?>
+<p:sld xmlns:a="http://schemas.openxmlformats.org/drawingml/2006/main" xmlns:r="http://schemas.openxmlformats.org/officeDocument/2006/relationships" xmlns:p="http://schemas.openxmlformats.org/presentationml/2006/main">
+  <p:cSld>
+    <p:spTree>
+      <p:nvGrpSpPr>
+        <p:cNvPr id="1" name=""/>
+        <p:cNvGrpSpPr/>
+        <p:nvPr/>
+      </p:nvGrpSpPr>
+      <p:grpSpPr>
+        <a:xfrm>
+          <a:off x="0" y="0"/>
+          <a:ext cx="0" cy="0"/>
+          <a:chOff x="0" y="0"/>
+          <a:chExt cx="0" cy="0"/>
+        </a:xfrm>
+      </p:grpSpPr>
+      <p:sp>
+        <p:nvSpPr>
+          <p:cNvPr id="2" name="Title 1">
+            <a:extLst>
+              <a:ext uri="{FF2B5EF4-FFF2-40B4-BE49-F238E27FC236}">
+                <a16:creationId xmlns:a16="http://schemas.microsoft.com/office/drawing/2014/main" id="{9473D8A1-4E4E-6E45-A515-E74232CD462A}"/>
+              </a:ext>
+            </a:extLst>
+          </p:cNvPr>
+          <p:cNvSpPr>
+            <a:spLocks noGrp="1"/>
+          </p:cNvSpPr>
+          <p:nvPr>
+            <p:ph type="title"/>
+          </p:nvPr>
+        </p:nvSpPr>
+        <p:spPr/>
+        <p:txBody>
+          <a:bodyPr/>
+          <a:lstStyle/>
+          <a:p>
+            <a:r>
+              <a:rPr lang="en-US" dirty="0"/>
+              <a:t>Q3, which/where is the real data? </a:t>
+            </a:r>
+          </a:p>
+        </p:txBody>
+      </p:sp>
+      <p:sp>
+        <p:nvSpPr>
+          <p:cNvPr id="3" name="TextBox 2">
+            <a:extLst>
+              <a:ext uri="{FF2B5EF4-FFF2-40B4-BE49-F238E27FC236}">
+                <a16:creationId xmlns:a16="http://schemas.microsoft.com/office/drawing/2014/main" id="{4CDBEBEC-A1C3-B840-8161-35CC021BF707}"/>
+              </a:ext>
+            </a:extLst>
+          </p:cNvPr>
+          <p:cNvSpPr txBox="1"/>
+          <p:nvPr/>
+        </p:nvSpPr>
+        <p:spPr>
+          <a:xfrm>
+            <a:off x="2726648" y="4760912"/>
+            <a:ext cx="6738704" cy="523220"/>
+          </a:xfrm>
+          <a:prstGeom prst="rect">
+            <a:avLst/>
+          </a:prstGeom>
+          <a:solidFill>
+            <a:srgbClr val="FFFF00"/>
+          </a:solidFill>
+        </p:spPr>
+        <p:txBody>
+          <a:bodyPr wrap="none" rtlCol="0">
+            <a:spAutoFit/>
+          </a:bodyPr>
+          <a:lstStyle/>
+          <a:p>
+            <a:r>
+              <a:rPr lang="en-US" sz="2800" b="1" dirty="0"/>
+              <a:t>It seems to be </a:t>
+            </a:r>
+            <a:r>
+              <a:rPr lang="en-US" sz="2800" b="1" dirty="0" err="1"/>
+              <a:t>input.txt</a:t>
+            </a:r>
+            <a:r>
+              <a:rPr lang="en-US" sz="2800" b="1" dirty="0"/>
+              <a:t>, but need to be sure</a:t>
+            </a:r>
+          </a:p>
+        </p:txBody>
+      </p:sp>
+      <p:pic>
+        <p:nvPicPr>
+          <p:cNvPr id="5" name="Picture 4">
+            <a:extLst>
+              <a:ext uri="{FF2B5EF4-FFF2-40B4-BE49-F238E27FC236}">
+                <a16:creationId xmlns:a16="http://schemas.microsoft.com/office/drawing/2014/main" id="{ACAB5B66-6B4E-FB48-B9F7-13E8AB1E1268}"/>
+              </a:ext>
+            </a:extLst>
+          </p:cNvPr>
+          <p:cNvPicPr>
+            <a:picLocks noChangeAspect="1"/>
+          </p:cNvPicPr>
+          <p:nvPr/>
+        </p:nvPicPr>
+        <p:blipFill>
+          <a:blip r:embed="rId2"/>
+          <a:stretch>
+            <a:fillRect/>
+          </a:stretch>
+        </p:blipFill>
+        <p:spPr>
+          <a:xfrm>
+            <a:off x="285750" y="2514600"/>
+            <a:ext cx="11620500" cy="1828800"/>
+          </a:xfrm>
+          <a:prstGeom prst="rect">
+            <a:avLst/>
+          </a:prstGeom>
+        </p:spPr>
+      </p:pic>
+    </p:spTree>
+    <p:extLst>
+      <p:ext uri="{BB962C8B-B14F-4D97-AF65-F5344CB8AC3E}">
+        <p14:creationId xmlns:p14="http://schemas.microsoft.com/office/powerpoint/2010/main" val="2474211815"/>
+      </p:ext>
+    </p:extLst>
+  </p:cSld>
+  <p:clrMapOvr>
+    <a:masterClrMapping/>
+  </p:clrMapOvr>
+</p:sld>
+</file>
+
+<file path=ppt/slides/slide7.xml><?xml version="1.0" encoding="utf-8"?>
+<p:sld xmlns:a="http://schemas.openxmlformats.org/drawingml/2006/main" xmlns:r="http://schemas.openxmlformats.org/officeDocument/2006/relationships" xmlns:p="http://schemas.openxmlformats.org/presentationml/2006/main">
+  <p:cSld>
+    <p:spTree>
+      <p:nvGrpSpPr>
+        <p:cNvPr id="1" name=""/>
+        <p:cNvGrpSpPr/>
+        <p:nvPr/>
+      </p:nvGrpSpPr>
+      <p:grpSpPr>
+        <a:xfrm>
+          <a:off x="0" y="0"/>
+          <a:ext cx="0" cy="0"/>
+          <a:chOff x="0" y="0"/>
+          <a:chExt cx="0" cy="0"/>
+        </a:xfrm>
+      </p:grpSpPr>
+      <p:sp>
+        <p:nvSpPr>
+          <p:cNvPr id="2" name="Title 1">
+            <a:extLst>
+              <a:ext uri="{FF2B5EF4-FFF2-40B4-BE49-F238E27FC236}">
+                <a16:creationId xmlns:a16="http://schemas.microsoft.com/office/drawing/2014/main" id="{A87EC649-8B4D-4C44-ABA0-81C11F5B6E0C}"/>
+              </a:ext>
+            </a:extLst>
+          </p:cNvPr>
+          <p:cNvSpPr>
+            <a:spLocks noGrp="1"/>
+          </p:cNvSpPr>
+          <p:nvPr>
+            <p:ph type="title"/>
+          </p:nvPr>
+        </p:nvSpPr>
+        <p:spPr/>
+        <p:txBody>
+          <a:bodyPr/>
+          <a:lstStyle/>
+          <a:p>
+            <a:r>
+              <a:rPr lang="en-US" dirty="0"/>
+              <a:t>Q4, we ONLY have two .txt files</a:t>
+            </a:r>
+          </a:p>
+        </p:txBody>
+      </p:sp>
+      <p:pic>
+        <p:nvPicPr>
+          <p:cNvPr id="4" name="Picture 3">
+            <a:extLst>
+              <a:ext uri="{FF2B5EF4-FFF2-40B4-BE49-F238E27FC236}">
+                <a16:creationId xmlns:a16="http://schemas.microsoft.com/office/drawing/2014/main" id="{755C52CC-5B80-244F-8F00-C321F826ED72}"/>
+              </a:ext>
+            </a:extLst>
+          </p:cNvPr>
+          <p:cNvPicPr>
+            <a:picLocks noChangeAspect="1"/>
+          </p:cNvPicPr>
+          <p:nvPr/>
+        </p:nvPicPr>
+        <p:blipFill>
+          <a:blip r:embed="rId2"/>
+          <a:stretch>
+            <a:fillRect/>
+          </a:stretch>
+        </p:blipFill>
+        <p:spPr>
+          <a:xfrm>
+            <a:off x="0" y="2927252"/>
+            <a:ext cx="12192000" cy="4051495"/>
+          </a:xfrm>
+          <a:prstGeom prst="rect">
+            <a:avLst/>
+          </a:prstGeom>
+        </p:spPr>
+      </p:pic>
+      <p:sp>
+        <p:nvSpPr>
+          <p:cNvPr id="5" name="TextBox 4">
+            <a:extLst>
+              <a:ext uri="{FF2B5EF4-FFF2-40B4-BE49-F238E27FC236}">
+                <a16:creationId xmlns:a16="http://schemas.microsoft.com/office/drawing/2014/main" id="{035738E1-6054-1D4F-A06E-15CBF4CB38CF}"/>
+              </a:ext>
+            </a:extLst>
+          </p:cNvPr>
+          <p:cNvSpPr txBox="1"/>
+          <p:nvPr/>
+        </p:nvSpPr>
+        <p:spPr>
+          <a:xfrm>
+            <a:off x="2819400" y="1943100"/>
+            <a:ext cx="7157537" cy="523220"/>
+          </a:xfrm>
+          <a:prstGeom prst="rect">
+            <a:avLst/>
+          </a:prstGeom>
+          <a:solidFill>
+            <a:srgbClr val="FFFF00"/>
+          </a:solidFill>
+        </p:spPr>
+        <p:txBody>
+          <a:bodyPr wrap="none" rtlCol="0">
+            <a:spAutoFit/>
+          </a:bodyPr>
+          <a:lstStyle/>
+          <a:p>
+            <a:r>
+              <a:rPr lang="en-US" sz="2800" dirty="0"/>
+              <a:t>where it the third one?? Or, could it be a typo??</a:t>
+            </a:r>
+          </a:p>
+        </p:txBody>
+      </p:sp>
+      <p:cxnSp>
+        <p:nvCxnSpPr>
+          <p:cNvPr id="7" name="Straight Arrow Connector 6">
+            <a:extLst>
+              <a:ext uri="{FF2B5EF4-FFF2-40B4-BE49-F238E27FC236}">
+                <a16:creationId xmlns:a16="http://schemas.microsoft.com/office/drawing/2014/main" id="{9E06DC4D-A689-0B4E-9E2D-7C9D1F10B448}"/>
+              </a:ext>
+            </a:extLst>
+          </p:cNvPr>
+          <p:cNvCxnSpPr/>
+          <p:nvPr/>
+        </p:nvCxnSpPr>
+        <p:spPr>
+          <a:xfrm>
+            <a:off x="6705600" y="2466320"/>
+            <a:ext cx="0" cy="460932"/>
+          </a:xfrm>
+          <a:prstGeom prst="straightConnector1">
+            <a:avLst/>
+          </a:prstGeom>
+          <a:ln w="57150">
+            <a:tailEnd type="triangle"/>
+          </a:ln>
+        </p:spPr>
+        <p:style>
+          <a:lnRef idx="1">
+            <a:schemeClr val="accent1"/>
+          </a:lnRef>
+          <a:fillRef idx="0">
+            <a:schemeClr val="accent1"/>
+          </a:fillRef>
+          <a:effectRef idx="0">
+            <a:schemeClr val="accent1"/>
+          </a:effectRef>
+          <a:fontRef idx="minor">
+            <a:schemeClr val="tx1"/>
+          </a:fontRef>
+        </p:style>
+      </p:cxnSp>
+      <p:cxnSp>
+        <p:nvCxnSpPr>
+          <p:cNvPr id="9" name="Straight Arrow Connector 8">
+            <a:extLst>
+              <a:ext uri="{FF2B5EF4-FFF2-40B4-BE49-F238E27FC236}">
+                <a16:creationId xmlns:a16="http://schemas.microsoft.com/office/drawing/2014/main" id="{E5851F5E-FC25-8147-B607-F9260F678242}"/>
+              </a:ext>
+            </a:extLst>
+          </p:cNvPr>
+          <p:cNvCxnSpPr/>
+          <p:nvPr/>
+        </p:nvCxnSpPr>
+        <p:spPr>
+          <a:xfrm flipH="1">
+            <a:off x="5118100" y="2466320"/>
+            <a:ext cx="711200" cy="3413780"/>
+          </a:xfrm>
+          <a:prstGeom prst="straightConnector1">
+            <a:avLst/>
+          </a:prstGeom>
+          <a:ln w="57150">
+            <a:solidFill>
+              <a:srgbClr val="FF0000"/>
+            </a:solidFill>
+            <a:tailEnd type="triangle"/>
+          </a:ln>
+        </p:spPr>
+        <p:style>
+          <a:lnRef idx="1">
+            <a:schemeClr val="accent1"/>
+          </a:lnRef>
+          <a:fillRef idx="0">
+            <a:schemeClr val="accent1"/>
+          </a:fillRef>
+          <a:effectRef idx="0">
+            <a:schemeClr val="accent1"/>
+          </a:effectRef>
+          <a:fontRef idx="minor">
+            <a:schemeClr val="tx1"/>
+          </a:fontRef>
+        </p:style>
+      </p:cxnSp>
+    </p:spTree>
+    <p:extLst>
+      <p:ext uri="{BB962C8B-B14F-4D97-AF65-F5344CB8AC3E}">
+        <p14:creationId xmlns:p14="http://schemas.microsoft.com/office/powerpoint/2010/main" val="221769572"/>
       </p:ext>
     </p:extLst>
   </p:cSld>

</xml_diff>